<commit_message>
added github link in pptx
</commit_message>
<xml_diff>
--- a/programming_CertiKOS.pptx
+++ b/programming_CertiKOS.pptx
@@ -4205,7 +4205,7 @@
             <a:pPr algn="ctr"/>
             <a:r>
               <a:rPr lang="en-US" sz="3600"/>
-              <a:t>Πως CertiKOS προστατεύει ;</a:t>
+              <a:t>Πως το CertiKOS προστατεύει ;</a:t>
             </a:r>
             <a:endParaRPr lang="en-US" sz="3600"/>
           </a:p>
@@ -4272,7 +4272,7 @@
           <a:p>
             <a:r>
               <a:rPr lang="en-US" sz="2400"/>
-              <a:t>O Hacker δεν μπορεί να δεσμεύσει απεριόριστους πόους, καθώς η </a:t>
+              <a:t>O Hacker δεν μπορεί να δεσμεύσει απεριόριστους πόρους, καθώς η </a:t>
             </a:r>
             <a:r>
               <a:rPr lang="en-US" sz="2400" b="1">
@@ -4556,6 +4556,7 @@
         <p:txBody>
           <a:bodyPr/>
           <a:p>
+            <a:pPr algn="ctr"/>
             <a:r>
               <a:rPr lang="en-US"/>
               <a:t>σύνδεσμος για τον αντίστοιχο κώδικα στο github</a:t>
@@ -4580,7 +4581,7 @@
           <a:p>
             <a:r>
               <a:rPr lang="en-US"/>
-              <a:t>link </a:t>
+              <a:t>link https://github.com/georgiabasa/project_security</a:t>
             </a:r>
             <a:endParaRPr lang="en-US"/>
           </a:p>
@@ -4610,7 +4611,7 @@
               <a:rPr lang="en-US">
                 <a:sym typeface="+mn-ea"/>
               </a:rPr>
-              <a:t>workspace/certikos/kernel</a:t>
+              <a:t>workspace/certikos/kernel.</a:t>
             </a:r>
             <a:endParaRPr lang="en-US">
               <a:sym typeface="+mn-ea"/>
@@ -4979,7 +4980,7 @@
             </a:pPr>
             <a:r>
               <a:rPr lang="en-US" sz="2400"/>
-              <a:t>Περιλαμβάει 6500 γραμμές C και x86 assembly, και η απόδειξη λειτουργικής ορθότητας για πολυνηματική λειτορυγία ολοκληρώθηκε σε λιγότερο από 2 ανθρωποέτη. Είναι η πρώτη τέτοια απόδειξη για γενικού σκοπού OS πυρήνα.</a:t>
+              <a:t>Περιλαμβάει 6500 γραμμές C και x86 assembly, και η απόδειξη λειτουργικής ορθότητας για πολυνηματική λειτουργία ολοκληρώθηκε σε λιγότερο από 2 ανθρωποέτη. Είναι η πρώτη τέτοια απόδειξη για γενικού σκοπού OS πυρήνα.</a:t>
             </a:r>
             <a:endParaRPr lang="en-US" sz="2400"/>
           </a:p>
@@ -5322,7 +5323,7 @@
               <a:rPr lang="en-US">
                 <a:sym typeface="+mn-ea"/>
               </a:rPr>
-              <a:t>, ενός εραλείου λογικής και μαθηματικής απόδειξης, για να εξασφαλιστεί η ακεραιότητα του μικροπυρήνα. </a:t>
+              <a:t>, ενός εργαλείου λογικής και μαθηματικής απόδειξης, για να εξασφαλιστεί η ακεραιότητα του μικροπυρήνα. </a:t>
             </a:r>
             <a:endParaRPr lang="en-US"/>
           </a:p>
@@ -5405,7 +5406,7 @@
           <a:p>
             <a:r>
               <a:rPr lang="en-US" sz="2400"/>
-              <a:t>Υπερόπτες</a:t>
+              <a:t>Hypervisors</a:t>
             </a:r>
             <a:endParaRPr lang="en-US" sz="2400"/>
           </a:p>
@@ -5562,7 +5563,7 @@
 <file path=ppt/theme/theme1.xml><?xml version="1.0" encoding="utf-8"?>
 <a:theme xmlns:a="http://schemas.openxmlformats.org/drawingml/2006/main" name="Office Theme">
   <a:themeElements>
-    <a:clrScheme name="Office">
+    <a:clrScheme name="Calligraphy">
       <a:dk1>
         <a:sysClr val="windowText" lastClr="000000"/>
       </a:dk1>
@@ -5570,34 +5571,34 @@
         <a:sysClr val="window" lastClr="FFFFFF"/>
       </a:lt1>
       <a:dk2>
-        <a:srgbClr val="44546A"/>
+        <a:srgbClr val="411401"/>
       </a:dk2>
       <a:lt2>
-        <a:srgbClr val="E7E6E6"/>
+        <a:srgbClr val="FFE6E6"/>
       </a:lt2>
       <a:accent1>
-        <a:srgbClr val="5B9BD5"/>
+        <a:srgbClr val="A24A48"/>
       </a:accent1>
       <a:accent2>
-        <a:srgbClr val="ED7D31"/>
+        <a:srgbClr val="B2935C"/>
       </a:accent2>
       <a:accent3>
-        <a:srgbClr val="A5A5A5"/>
+        <a:srgbClr val="6A9A9A"/>
       </a:accent3>
       <a:accent4>
-        <a:srgbClr val="FFC000"/>
+        <a:srgbClr val="B2B787"/>
       </a:accent4>
       <a:accent5>
-        <a:srgbClr val="4472C4"/>
+        <a:srgbClr val="91644B"/>
       </a:accent5>
       <a:accent6>
-        <a:srgbClr val="70AD47"/>
+        <a:srgbClr val="654A76"/>
       </a:accent6>
       <a:hlink>
-        <a:srgbClr val="0563C1"/>
+        <a:srgbClr val="00A800"/>
       </a:hlink>
       <a:folHlink>
-        <a:srgbClr val="954F72"/>
+        <a:srgbClr val="FF00FF"/>
       </a:folHlink>
     </a:clrScheme>
     <a:fontScheme name="Arial Black-Arial">

</xml_diff>